<commit_message>
PowerPoint update [ Issue #49 ]
</commit_message>
<xml_diff>
--- a/Iteration 3/RAW Files/Iteration-3_Presentation.pptx
+++ b/Iteration 3/RAW Files/Iteration-3_Presentation.pptx
@@ -7,12 +7,14 @@
   <p:sldIdLst>
     <p:sldId id="256" r:id="rId2"/>
     <p:sldId id="266" r:id="rId3"/>
-    <p:sldId id="257" r:id="rId4"/>
-    <p:sldId id="259" r:id="rId5"/>
-    <p:sldId id="262" r:id="rId6"/>
-    <p:sldId id="260" r:id="rId7"/>
-    <p:sldId id="261" r:id="rId8"/>
-    <p:sldId id="265" r:id="rId9"/>
+    <p:sldId id="262" r:id="rId4"/>
+    <p:sldId id="267" r:id="rId5"/>
+    <p:sldId id="268" r:id="rId6"/>
+    <p:sldId id="257" r:id="rId7"/>
+    <p:sldId id="259" r:id="rId8"/>
+    <p:sldId id="260" r:id="rId9"/>
+    <p:sldId id="261" r:id="rId10"/>
+    <p:sldId id="265" r:id="rId11"/>
   </p:sldIdLst>
   <p:sldSz cx="12192000" cy="6858000"/>
   <p:notesSz cx="6858000" cy="9144000"/>
@@ -5996,7 +5998,689 @@
 </p:sld>
 </file>
 
+<file path=ppt/slides/slide10.xml><?xml version="1.0" encoding="utf-8"?>
+<p:sld xmlns:a="http://schemas.openxmlformats.org/drawingml/2006/main" xmlns:r="http://schemas.openxmlformats.org/officeDocument/2006/relationships" xmlns:p="http://schemas.openxmlformats.org/presentationml/2006/main">
+  <p:cSld>
+    <p:spTree>
+      <p:nvGrpSpPr>
+        <p:cNvPr id="1" name=""/>
+        <p:cNvGrpSpPr/>
+        <p:nvPr/>
+      </p:nvGrpSpPr>
+      <p:grpSpPr>
+        <a:xfrm>
+          <a:off x="0" y="0"/>
+          <a:ext cx="0" cy="0"/>
+          <a:chOff x="0" y="0"/>
+          <a:chExt cx="0" cy="0"/>
+        </a:xfrm>
+      </p:grpSpPr>
+      <p:sp>
+        <p:nvSpPr>
+          <p:cNvPr id="2" name="Title 1">
+            <a:extLst>
+              <a:ext uri="{FF2B5EF4-FFF2-40B4-BE49-F238E27FC236}">
+                <a16:creationId xmlns:a16="http://schemas.microsoft.com/office/drawing/2014/main" id="{8A15E44B-8D52-2942-B951-9B44BA75ABEA}"/>
+              </a:ext>
+            </a:extLst>
+          </p:cNvPr>
+          <p:cNvSpPr>
+            <a:spLocks noGrp="1"/>
+          </p:cNvSpPr>
+          <p:nvPr>
+            <p:ph type="title"/>
+          </p:nvPr>
+        </p:nvSpPr>
+        <p:spPr/>
+        <p:txBody>
+          <a:bodyPr/>
+          <a:lstStyle/>
+          <a:p>
+            <a:r>
+              <a:rPr lang="en-US" dirty="0"/>
+              <a:t>Website</a:t>
+            </a:r>
+          </a:p>
+        </p:txBody>
+      </p:sp>
+      <p:sp>
+        <p:nvSpPr>
+          <p:cNvPr id="3" name="Content Placeholder 2">
+            <a:extLst>
+              <a:ext uri="{FF2B5EF4-FFF2-40B4-BE49-F238E27FC236}">
+                <a16:creationId xmlns:a16="http://schemas.microsoft.com/office/drawing/2014/main" id="{AAC4512B-95DB-5A4C-B101-568EB1D24424}"/>
+              </a:ext>
+            </a:extLst>
+          </p:cNvPr>
+          <p:cNvSpPr>
+            <a:spLocks noGrp="1"/>
+          </p:cNvSpPr>
+          <p:nvPr>
+            <p:ph idx="1"/>
+          </p:nvPr>
+        </p:nvSpPr>
+        <p:spPr/>
+        <p:txBody>
+          <a:bodyPr>
+            <a:normAutofit/>
+          </a:bodyPr>
+          <a:lstStyle/>
+          <a:p>
+            <a:pPr marL="0" indent="0">
+              <a:buNone/>
+            </a:pPr>
+            <a:r>
+              <a:rPr lang="en-US" sz="2000" b="1" dirty="0">
+                <a:hlinkClick r:id="rId2"/>
+              </a:rPr>
+              <a:t>https://baylorsailor.github.io/C.A.R./site</a:t>
+            </a:r>
+            <a:endParaRPr lang="en-US" sz="2000" b="1" dirty="0"/>
+          </a:p>
+        </p:txBody>
+      </p:sp>
+      <p:pic>
+        <p:nvPicPr>
+          <p:cNvPr id="4" name="Picture 3">
+            <a:extLst>
+              <a:ext uri="{FF2B5EF4-FFF2-40B4-BE49-F238E27FC236}">
+                <a16:creationId xmlns:a16="http://schemas.microsoft.com/office/drawing/2014/main" id="{028A15CB-9C13-4E4F-990D-A79D4338D78A}"/>
+              </a:ext>
+            </a:extLst>
+          </p:cNvPr>
+          <p:cNvPicPr>
+            <a:picLocks noChangeAspect="1"/>
+          </p:cNvPicPr>
+          <p:nvPr/>
+        </p:nvPicPr>
+        <p:blipFill>
+          <a:blip r:embed="rId3"/>
+          <a:stretch>
+            <a:fillRect/>
+          </a:stretch>
+        </p:blipFill>
+        <p:spPr>
+          <a:xfrm>
+            <a:off x="8834422" y="5161997"/>
+            <a:ext cx="2968655" cy="1665111"/>
+          </a:xfrm>
+          <a:prstGeom prst="rect">
+            <a:avLst/>
+          </a:prstGeom>
+        </p:spPr>
+      </p:pic>
+    </p:spTree>
+    <p:extLst>
+      <p:ext uri="{BB962C8B-B14F-4D97-AF65-F5344CB8AC3E}">
+        <p14:creationId xmlns:p14="http://schemas.microsoft.com/office/powerpoint/2010/main" val="1049443972"/>
+      </p:ext>
+    </p:extLst>
+  </p:cSld>
+  <p:clrMapOvr>
+    <a:masterClrMapping/>
+  </p:clrMapOvr>
+</p:sld>
+</file>
+
 <file path=ppt/slides/slide2.xml><?xml version="1.0" encoding="utf-8"?>
+<p:sld xmlns:a="http://schemas.openxmlformats.org/drawingml/2006/main" xmlns:r="http://schemas.openxmlformats.org/officeDocument/2006/relationships" xmlns:p="http://schemas.openxmlformats.org/presentationml/2006/main">
+  <p:cSld>
+    <p:bg>
+      <p:bgPr>
+        <a:blipFill>
+          <a:blip r:embed="rId2">
+            <a:extLst/>
+          </a:blip>
+          <a:stretch/>
+        </a:blipFill>
+        <a:effectLst/>
+      </p:bgPr>
+    </p:bg>
+    <p:spTree>
+      <p:nvGrpSpPr>
+        <p:cNvPr id="1" name=""/>
+        <p:cNvGrpSpPr/>
+        <p:nvPr/>
+      </p:nvGrpSpPr>
+      <p:grpSpPr>
+        <a:xfrm>
+          <a:off x="0" y="0"/>
+          <a:ext cx="0" cy="0"/>
+          <a:chOff x="0" y="0"/>
+          <a:chExt cx="0" cy="0"/>
+        </a:xfrm>
+      </p:grpSpPr>
+      <p:pic>
+        <p:nvPicPr>
+          <p:cNvPr id="23" name="Picture 22">
+            <a:extLst>
+              <a:ext uri="{FF2B5EF4-FFF2-40B4-BE49-F238E27FC236}">
+                <a16:creationId xmlns:a16="http://schemas.microsoft.com/office/drawing/2014/main" id="{CBECFFDC-94DB-4DA3-94FE-22FEDDA8FA30}"/>
+              </a:ext>
+              <a:ext uri="{C183D7F6-B498-43B3-948B-1728B52AA6E4}">
+                <adec:decorative xmlns:adec="http://schemas.microsoft.com/office/drawing/2017/decorative" val="1"/>
+              </a:ext>
+            </a:extLst>
+          </p:cNvPr>
+          <p:cNvPicPr>
+            <a:picLocks noGrp="1" noRot="1" noChangeAspect="1" noMove="1" noResize="1" noEditPoints="1" noAdjustHandles="1" noChangeArrowheads="1" noChangeShapeType="1" noCrop="1"/>
+          </p:cNvPicPr>
+          <p:nvPr>
+            <p:extLst>
+              <p:ext uri="{386F3935-93C4-4BCD-93E2-E3B085C9AB24}">
+                <p16:designElem xmlns:p16="http://schemas.microsoft.com/office/powerpoint/2015/main" val="1"/>
+              </p:ext>
+            </p:extLst>
+          </p:nvPr>
+        </p:nvPicPr>
+        <p:blipFill>
+          <a:blip r:embed="rId3">
+            <a:extLst>
+              <a:ext uri="{28A0092B-C50C-407E-A947-70E740481C1C}">
+                <a14:useLocalDpi xmlns:a14="http://schemas.microsoft.com/office/drawing/2010/main" val="0"/>
+              </a:ext>
+            </a:extLst>
+          </a:blip>
+          <a:stretch>
+            <a:fillRect/>
+          </a:stretch>
+        </p:blipFill>
+        <p:spPr>
+          <a:xfrm>
+            <a:off x="0" y="0"/>
+            <a:ext cx="12188825" cy="6856214"/>
+          </a:xfrm>
+          <a:prstGeom prst="rect">
+            <a:avLst/>
+          </a:prstGeom>
+        </p:spPr>
+      </p:pic>
+      <p:sp useBgFill="1">
+        <p:nvSpPr>
+          <p:cNvPr id="25" name="Rectangle 24">
+            <a:extLst>
+              <a:ext uri="{FF2B5EF4-FFF2-40B4-BE49-F238E27FC236}">
+                <a16:creationId xmlns:a16="http://schemas.microsoft.com/office/drawing/2014/main" id="{0DC895F7-4E59-40FB-87DD-ACE47F94C143}"/>
+              </a:ext>
+              <a:ext uri="{C183D7F6-B498-43B3-948B-1728B52AA6E4}">
+                <adec:decorative xmlns:adec="http://schemas.microsoft.com/office/drawing/2017/decorative" val="1"/>
+              </a:ext>
+            </a:extLst>
+          </p:cNvPr>
+          <p:cNvSpPr>
+            <a:spLocks noGrp="1" noRot="1" noChangeAspect="1" noMove="1" noResize="1" noEditPoints="1" noAdjustHandles="1" noChangeArrowheads="1" noChangeShapeType="1" noTextEdit="1"/>
+          </p:cNvSpPr>
+          <p:nvPr>
+            <p:extLst>
+              <p:ext uri="{386F3935-93C4-4BCD-93E2-E3B085C9AB24}">
+                <p16:designElem xmlns:p16="http://schemas.microsoft.com/office/powerpoint/2015/main" val="1"/>
+              </p:ext>
+            </p:extLst>
+          </p:nvPr>
+        </p:nvSpPr>
+        <p:spPr>
+          <a:xfrm>
+            <a:off x="0" y="0"/>
+            <a:ext cx="12188825" cy="6856214"/>
+          </a:xfrm>
+          <a:prstGeom prst="rect">
+            <a:avLst/>
+          </a:prstGeom>
+          <a:ln>
+            <a:noFill/>
+          </a:ln>
+        </p:spPr>
+        <p:style>
+          <a:lnRef idx="2">
+            <a:schemeClr val="accent1">
+              <a:shade val="50000"/>
+            </a:schemeClr>
+          </a:lnRef>
+          <a:fillRef idx="1">
+            <a:schemeClr val="accent1"/>
+          </a:fillRef>
+          <a:effectRef idx="0">
+            <a:schemeClr val="accent1"/>
+          </a:effectRef>
+          <a:fontRef idx="minor">
+            <a:schemeClr val="lt1"/>
+          </a:fontRef>
+        </p:style>
+        <p:txBody>
+          <a:bodyPr rtlCol="0" anchor="ctr"/>
+          <a:lstStyle/>
+          <a:p>
+            <a:pPr algn="ctr"/>
+            <a:endParaRPr lang="en-US"/>
+          </a:p>
+        </p:txBody>
+      </p:sp>
+      <p:pic>
+        <p:nvPicPr>
+          <p:cNvPr id="9" name="Picture 8">
+            <a:extLst>
+              <a:ext uri="{FF2B5EF4-FFF2-40B4-BE49-F238E27FC236}">
+                <a16:creationId xmlns:a16="http://schemas.microsoft.com/office/drawing/2014/main" id="{4CDE3F3C-C2AB-F341-98B3-821A14E3C135}"/>
+              </a:ext>
+            </a:extLst>
+          </p:cNvPr>
+          <p:cNvPicPr>
+            <a:picLocks noChangeAspect="1"/>
+          </p:cNvPicPr>
+          <p:nvPr/>
+        </p:nvPicPr>
+        <p:blipFill rotWithShape="1">
+          <a:blip r:embed="rId4">
+            <a:alphaModFix amt="20000"/>
+            <a:extLst/>
+          </a:blip>
+          <a:srcRect t="2116" b="37074"/>
+          <a:stretch/>
+        </p:blipFill>
+        <p:spPr>
+          <a:xfrm>
+            <a:off x="20" y="10"/>
+            <a:ext cx="12191980" cy="6857990"/>
+          </a:xfrm>
+          <a:prstGeom prst="rect">
+            <a:avLst/>
+          </a:prstGeom>
+        </p:spPr>
+      </p:pic>
+      <p:pic>
+        <p:nvPicPr>
+          <p:cNvPr id="27" name="Picture 26">
+            <a:extLst>
+              <a:ext uri="{FF2B5EF4-FFF2-40B4-BE49-F238E27FC236}">
+                <a16:creationId xmlns:a16="http://schemas.microsoft.com/office/drawing/2014/main" id="{1A4C720E-710D-44F8-A8D7-2BAA61E1814B}"/>
+              </a:ext>
+              <a:ext uri="{C183D7F6-B498-43B3-948B-1728B52AA6E4}">
+                <adec:decorative xmlns:adec="http://schemas.microsoft.com/office/drawing/2017/decorative" val="1"/>
+              </a:ext>
+            </a:extLst>
+          </p:cNvPr>
+          <p:cNvPicPr>
+            <a:picLocks noGrp="1" noRot="1" noChangeAspect="1" noMove="1" noResize="1" noEditPoints="1" noAdjustHandles="1" noChangeArrowheads="1" noChangeShapeType="1" noCrop="1"/>
+          </p:cNvPicPr>
+          <p:nvPr>
+            <p:extLst>
+              <p:ext uri="{386F3935-93C4-4BCD-93E2-E3B085C9AB24}">
+                <p16:designElem xmlns:p16="http://schemas.microsoft.com/office/powerpoint/2015/main" val="1"/>
+              </p:ext>
+            </p:extLst>
+          </p:nvPr>
+        </p:nvPicPr>
+        <p:blipFill>
+          <a:blip r:embed="rId3">
+            <a:alphaModFix amt="51000"/>
+            <a:extLst>
+              <a:ext uri="{28A0092B-C50C-407E-A947-70E740481C1C}">
+                <a14:useLocalDpi xmlns:a14="http://schemas.microsoft.com/office/drawing/2010/main" val="0"/>
+              </a:ext>
+            </a:extLst>
+          </a:blip>
+          <a:stretch>
+            <a:fillRect/>
+          </a:stretch>
+        </p:blipFill>
+        <p:spPr>
+          <a:xfrm>
+            <a:off x="0" y="0"/>
+            <a:ext cx="12188825" cy="6856214"/>
+          </a:xfrm>
+          <a:prstGeom prst="rect">
+            <a:avLst/>
+          </a:prstGeom>
+        </p:spPr>
+      </p:pic>
+      <p:sp>
+        <p:nvSpPr>
+          <p:cNvPr id="2" name="Title 1">
+            <a:extLst>
+              <a:ext uri="{FF2B5EF4-FFF2-40B4-BE49-F238E27FC236}">
+                <a16:creationId xmlns:a16="http://schemas.microsoft.com/office/drawing/2014/main" id="{103ED0D9-DE7F-1D4D-AF58-B2E9861A0DD0}"/>
+              </a:ext>
+            </a:extLst>
+          </p:cNvPr>
+          <p:cNvSpPr>
+            <a:spLocks noGrp="1"/>
+          </p:cNvSpPr>
+          <p:nvPr>
+            <p:ph type="title"/>
+          </p:nvPr>
+        </p:nvSpPr>
+        <p:spPr>
+          <a:xfrm>
+            <a:off x="-1" y="0"/>
+            <a:ext cx="9238593" cy="2421464"/>
+          </a:xfrm>
+        </p:spPr>
+        <p:txBody>
+          <a:bodyPr vert="horz" lIns="91440" tIns="45720" rIns="91440" bIns="45720" rtlCol="0" anchor="b">
+            <a:normAutofit/>
+          </a:bodyPr>
+          <a:lstStyle/>
+          <a:p>
+            <a:pPr algn="r"/>
+            <a:r>
+              <a:rPr lang="en-US" sz="4800" dirty="0"/>
+              <a:t>Where we are now, Chapter 3: a completed project</a:t>
+            </a:r>
+          </a:p>
+        </p:txBody>
+      </p:sp>
+    </p:spTree>
+    <p:extLst>
+      <p:ext uri="{BB962C8B-B14F-4D97-AF65-F5344CB8AC3E}">
+        <p14:creationId xmlns:p14="http://schemas.microsoft.com/office/powerpoint/2010/main" val="1974521838"/>
+      </p:ext>
+    </p:extLst>
+  </p:cSld>
+  <p:clrMapOvr>
+    <a:masterClrMapping/>
+  </p:clrMapOvr>
+</p:sld>
+</file>
+
+<file path=ppt/slides/slide3.xml><?xml version="1.0" encoding="utf-8"?>
+<p:sld xmlns:a="http://schemas.openxmlformats.org/drawingml/2006/main" xmlns:r="http://schemas.openxmlformats.org/officeDocument/2006/relationships" xmlns:p="http://schemas.openxmlformats.org/presentationml/2006/main">
+  <p:cSld>
+    <p:bg>
+      <p:bgPr>
+        <a:blipFill>
+          <a:blip r:embed="rId2">
+            <a:extLst/>
+          </a:blip>
+          <a:stretch/>
+        </a:blipFill>
+        <a:effectLst/>
+      </p:bgPr>
+    </p:bg>
+    <p:spTree>
+      <p:nvGrpSpPr>
+        <p:cNvPr id="1" name=""/>
+        <p:cNvGrpSpPr/>
+        <p:nvPr/>
+      </p:nvGrpSpPr>
+      <p:grpSpPr>
+        <a:xfrm>
+          <a:off x="0" y="0"/>
+          <a:ext cx="0" cy="0"/>
+          <a:chOff x="0" y="0"/>
+          <a:chExt cx="0" cy="0"/>
+        </a:xfrm>
+      </p:grpSpPr>
+      <p:pic>
+        <p:nvPicPr>
+          <p:cNvPr id="13" name="Picture 12">
+            <a:extLst>
+              <a:ext uri="{FF2B5EF4-FFF2-40B4-BE49-F238E27FC236}">
+                <a16:creationId xmlns:a16="http://schemas.microsoft.com/office/drawing/2014/main" id="{6AF6706C-CF07-43A1-BCC4-CBA5D33820DA}"/>
+              </a:ext>
+              <a:ext uri="{C183D7F6-B498-43B3-948B-1728B52AA6E4}">
+                <adec:decorative xmlns:adec="http://schemas.microsoft.com/office/drawing/2017/decorative" val="1"/>
+              </a:ext>
+            </a:extLst>
+          </p:cNvPr>
+          <p:cNvPicPr>
+            <a:picLocks noGrp="1" noRot="1" noChangeAspect="1" noMove="1" noResize="1" noEditPoints="1" noAdjustHandles="1" noChangeArrowheads="1" noChangeShapeType="1" noCrop="1"/>
+          </p:cNvPicPr>
+          <p:nvPr>
+            <p:extLst>
+              <p:ext uri="{386F3935-93C4-4BCD-93E2-E3B085C9AB24}">
+                <p16:designElem xmlns:p16="http://schemas.microsoft.com/office/powerpoint/2015/main" val="1"/>
+              </p:ext>
+            </p:extLst>
+          </p:nvPr>
+        </p:nvPicPr>
+        <p:blipFill>
+          <a:blip r:embed="rId3">
+            <a:extLst>
+              <a:ext uri="{28A0092B-C50C-407E-A947-70E740481C1C}">
+                <a14:useLocalDpi xmlns:a14="http://schemas.microsoft.com/office/drawing/2010/main" val="0"/>
+              </a:ext>
+            </a:extLst>
+          </a:blip>
+          <a:stretch>
+            <a:fillRect/>
+          </a:stretch>
+        </p:blipFill>
+        <p:spPr>
+          <a:xfrm>
+            <a:off x="0" y="0"/>
+            <a:ext cx="12188825" cy="6856214"/>
+          </a:xfrm>
+          <a:prstGeom prst="rect">
+            <a:avLst/>
+          </a:prstGeom>
+        </p:spPr>
+      </p:pic>
+      <p:sp>
+        <p:nvSpPr>
+          <p:cNvPr id="6" name="TextBox 5">
+            <a:extLst>
+              <a:ext uri="{FF2B5EF4-FFF2-40B4-BE49-F238E27FC236}">
+                <a16:creationId xmlns:a16="http://schemas.microsoft.com/office/drawing/2014/main" id="{4434FC64-3EA1-194B-8D5F-413FE67516F0}"/>
+              </a:ext>
+            </a:extLst>
+          </p:cNvPr>
+          <p:cNvSpPr txBox="1"/>
+          <p:nvPr/>
+        </p:nvSpPr>
+        <p:spPr>
+          <a:xfrm>
+            <a:off x="643464" y="639097"/>
+            <a:ext cx="4789678" cy="3746634"/>
+          </a:xfrm>
+          <a:prstGeom prst="rect">
+            <a:avLst/>
+          </a:prstGeom>
+        </p:spPr>
+        <p:txBody>
+          <a:bodyPr vert="horz" lIns="91440" tIns="45720" rIns="91440" bIns="45720" rtlCol="0" anchor="b">
+            <a:normAutofit/>
+          </a:bodyPr>
+          <a:lstStyle/>
+          <a:p>
+            <a:pPr algn="r">
+              <a:spcBef>
+                <a:spcPct val="0"/>
+              </a:spcBef>
+              <a:spcAft>
+                <a:spcPts val="600"/>
+              </a:spcAft>
+            </a:pPr>
+            <a:r>
+              <a:rPr lang="en-US" sz="4800" cap="all" dirty="0">
+                <a:ln w="3175" cmpd="sng">
+                  <a:noFill/>
+                </a:ln>
+                <a:latin typeface="+mj-lt"/>
+                <a:ea typeface="+mj-ea"/>
+                <a:cs typeface="+mj-cs"/>
+              </a:rPr>
+              <a:t>And now for a demo…</a:t>
+            </a:r>
+          </a:p>
+        </p:txBody>
+      </p:sp>
+      <p:pic>
+        <p:nvPicPr>
+          <p:cNvPr id="8" name="Picture 7">
+            <a:extLst>
+              <a:ext uri="{FF2B5EF4-FFF2-40B4-BE49-F238E27FC236}">
+                <a16:creationId xmlns:a16="http://schemas.microsoft.com/office/drawing/2014/main" id="{A76ED285-9B3B-6941-A913-12B4B9DE2B74}"/>
+              </a:ext>
+            </a:extLst>
+          </p:cNvPr>
+          <p:cNvPicPr>
+            <a:picLocks noChangeAspect="1"/>
+          </p:cNvPicPr>
+          <p:nvPr/>
+        </p:nvPicPr>
+        <p:blipFill>
+          <a:blip r:embed="rId4"/>
+          <a:stretch>
+            <a:fillRect/>
+          </a:stretch>
+        </p:blipFill>
+        <p:spPr>
+          <a:xfrm>
+            <a:off x="6076606" y="1573201"/>
+            <a:ext cx="5471927" cy="3707230"/>
+          </a:xfrm>
+          <a:prstGeom prst="roundRect">
+            <a:avLst>
+              <a:gd name="adj" fmla="val 4380"/>
+            </a:avLst>
+          </a:prstGeom>
+          <a:ln w="50800" cap="sq" cmpd="dbl">
+            <a:gradFill flip="none" rotWithShape="1">
+              <a:gsLst>
+                <a:gs pos="0">
+                  <a:srgbClr val="FFFFFF"/>
+                </a:gs>
+                <a:gs pos="100000">
+                  <a:schemeClr val="tx1">
+                    <a:alpha val="0"/>
+                  </a:schemeClr>
+                </a:gs>
+              </a:gsLst>
+              <a:path path="circle">
+                <a:fillToRect l="50000" t="50000" r="50000" b="50000"/>
+              </a:path>
+              <a:tileRect/>
+            </a:gradFill>
+            <a:miter lim="800000"/>
+          </a:ln>
+          <a:effectLst>
+            <a:outerShdw blurRad="254000" algn="tl" rotWithShape="0">
+              <a:srgbClr val="000000">
+                <a:alpha val="43000"/>
+              </a:srgbClr>
+            </a:outerShdw>
+          </a:effectLst>
+        </p:spPr>
+      </p:pic>
+    </p:spTree>
+    <p:extLst>
+      <p:ext uri="{BB962C8B-B14F-4D97-AF65-F5344CB8AC3E}">
+        <p14:creationId xmlns:p14="http://schemas.microsoft.com/office/powerpoint/2010/main" val="3384690365"/>
+      </p:ext>
+    </p:extLst>
+  </p:cSld>
+  <p:clrMapOvr>
+    <a:masterClrMapping/>
+  </p:clrMapOvr>
+</p:sld>
+</file>
+
+<file path=ppt/slides/slide4.xml><?xml version="1.0" encoding="utf-8"?>
+<p:sld xmlns:a="http://schemas.openxmlformats.org/drawingml/2006/main" xmlns:r="http://schemas.openxmlformats.org/officeDocument/2006/relationships" xmlns:p="http://schemas.openxmlformats.org/presentationml/2006/main">
+  <p:cSld>
+    <p:bg>
+      <p:bgPr>
+        <a:blipFill>
+          <a:blip r:embed="rId2">
+            <a:extLst/>
+          </a:blip>
+          <a:stretch/>
+        </a:blipFill>
+        <a:effectLst/>
+      </p:bgPr>
+    </p:bg>
+    <p:spTree>
+      <p:nvGrpSpPr>
+        <p:cNvPr id="1" name=""/>
+        <p:cNvGrpSpPr/>
+        <p:nvPr/>
+      </p:nvGrpSpPr>
+      <p:grpSpPr>
+        <a:xfrm>
+          <a:off x="0" y="0"/>
+          <a:ext cx="0" cy="0"/>
+          <a:chOff x="0" y="0"/>
+          <a:chExt cx="0" cy="0"/>
+        </a:xfrm>
+      </p:grpSpPr>
+      <p:sp>
+        <p:nvSpPr>
+          <p:cNvPr id="2" name="Title 1">
+            <a:extLst>
+              <a:ext uri="{FF2B5EF4-FFF2-40B4-BE49-F238E27FC236}">
+                <a16:creationId xmlns:a16="http://schemas.microsoft.com/office/drawing/2014/main" id="{103ED0D9-DE7F-1D4D-AF58-B2E9861A0DD0}"/>
+              </a:ext>
+            </a:extLst>
+          </p:cNvPr>
+          <p:cNvSpPr>
+            <a:spLocks noGrp="1"/>
+          </p:cNvSpPr>
+          <p:nvPr>
+            <p:ph type="title"/>
+          </p:nvPr>
+        </p:nvSpPr>
+        <p:spPr>
+          <a:xfrm>
+            <a:off x="7865806" y="643463"/>
+            <a:ext cx="3706762" cy="1608124"/>
+          </a:xfrm>
+        </p:spPr>
+        <p:txBody>
+          <a:bodyPr>
+            <a:normAutofit/>
+          </a:bodyPr>
+          <a:lstStyle/>
+          <a:p>
+            <a:r>
+              <a:rPr lang="en-US" dirty="0"/>
+              <a:t>Design Patterns</a:t>
+            </a:r>
+          </a:p>
+        </p:txBody>
+      </p:sp>
+      <p:pic>
+        <p:nvPicPr>
+          <p:cNvPr id="16" name="Content Placeholder 8">
+            <a:extLst>
+              <a:ext uri="{FF2B5EF4-FFF2-40B4-BE49-F238E27FC236}">
+                <a16:creationId xmlns:a16="http://schemas.microsoft.com/office/drawing/2014/main" id="{9572993E-6CF3-9C4A-821B-DF13D54EFBE8}"/>
+              </a:ext>
+            </a:extLst>
+          </p:cNvPr>
+          <p:cNvPicPr>
+            <a:picLocks noChangeAspect="1"/>
+          </p:cNvPicPr>
+          <p:nvPr/>
+        </p:nvPicPr>
+        <p:blipFill rotWithShape="1">
+          <a:blip r:embed="rId3"/>
+          <a:srcRect r="-2" b="2102"/>
+          <a:stretch/>
+        </p:blipFill>
+        <p:spPr>
+          <a:xfrm>
+            <a:off x="20" y="975"/>
+            <a:ext cx="7552924" cy="6858000"/>
+          </a:xfrm>
+          <a:prstGeom prst="rect">
+            <a:avLst/>
+          </a:prstGeom>
+        </p:spPr>
+      </p:pic>
+    </p:spTree>
+    <p:extLst>
+      <p:ext uri="{BB962C8B-B14F-4D97-AF65-F5344CB8AC3E}">
+        <p14:creationId xmlns:p14="http://schemas.microsoft.com/office/powerpoint/2010/main" val="3176842468"/>
+      </p:ext>
+    </p:extLst>
+  </p:cSld>
+  <p:clrMapOvr>
+    <a:masterClrMapping/>
+  </p:clrMapOvr>
+</p:sld>
+</file>
+
+<file path=ppt/slides/slide5.xml><?xml version="1.0" encoding="utf-8"?>
 <p:sld xmlns:a="http://schemas.openxmlformats.org/drawingml/2006/main" xmlns:r="http://schemas.openxmlformats.org/officeDocument/2006/relationships" xmlns:p="http://schemas.openxmlformats.org/presentationml/2006/main">
   <p:cSld>
     <p:bg>
@@ -6029,7 +6713,7 @@
           <p:cNvPr id="8" name="Content Placeholder 4">
             <a:extLst>
               <a:ext uri="{FF2B5EF4-FFF2-40B4-BE49-F238E27FC236}">
-                <a16:creationId xmlns:a16="http://schemas.microsoft.com/office/drawing/2014/main" id="{879A761F-BA36-8643-AD49-E1B97106C04A}"/>
+                <a16:creationId xmlns:a16="http://schemas.microsoft.com/office/drawing/2014/main" id="{D3B7D61E-91B4-FE43-A15D-15D89F02AE92}"/>
               </a:ext>
             </a:extLst>
           </p:cNvPr>
@@ -6039,83 +6723,24 @@
           <p:nvPr/>
         </p:nvPicPr>
         <p:blipFill rotWithShape="1">
-          <a:blip r:embed="rId3">
-            <a:alphaModFix amt="20000"/>
-          </a:blip>
-          <a:srcRect/>
+          <a:blip r:embed="rId3"/>
+          <a:srcRect l="1147" r="6892"/>
           <a:stretch/>
         </p:blipFill>
         <p:spPr>
           <a:xfrm>
-            <a:off x="20" y="10"/>
-            <a:ext cx="12191980" cy="6857990"/>
+            <a:off x="2319538" y="0"/>
+            <a:ext cx="7552924" cy="6858000"/>
           </a:xfrm>
           <a:prstGeom prst="rect">
             <a:avLst/>
           </a:prstGeom>
         </p:spPr>
       </p:pic>
-      <p:sp>
-        <p:nvSpPr>
-          <p:cNvPr id="2" name="Title 1">
-            <a:extLst>
-              <a:ext uri="{FF2B5EF4-FFF2-40B4-BE49-F238E27FC236}">
-                <a16:creationId xmlns:a16="http://schemas.microsoft.com/office/drawing/2014/main" id="{103ED0D9-DE7F-1D4D-AF58-B2E9861A0DD0}"/>
-              </a:ext>
-            </a:extLst>
-          </p:cNvPr>
-          <p:cNvSpPr>
-            <a:spLocks noGrp="1"/>
-          </p:cNvSpPr>
-          <p:nvPr>
-            <p:ph type="title"/>
-          </p:nvPr>
-        </p:nvSpPr>
-        <p:spPr/>
-        <p:txBody>
-          <a:bodyPr>
-            <a:normAutofit/>
-          </a:bodyPr>
-          <a:lstStyle/>
-          <a:p>
-            <a:r>
-              <a:rPr lang="en-US" dirty="0"/>
-              <a:t>Where we are now</a:t>
-            </a:r>
-          </a:p>
-        </p:txBody>
-      </p:sp>
-      <p:sp>
-        <p:nvSpPr>
-          <p:cNvPr id="10" name="Content Placeholder 9">
-            <a:extLst>
-              <a:ext uri="{FF2B5EF4-FFF2-40B4-BE49-F238E27FC236}">
-                <a16:creationId xmlns:a16="http://schemas.microsoft.com/office/drawing/2014/main" id="{220CBD19-010A-4C74-95F4-13D1E1117AC5}"/>
-              </a:ext>
-            </a:extLst>
-          </p:cNvPr>
-          <p:cNvSpPr>
-            <a:spLocks noGrp="1"/>
-          </p:cNvSpPr>
-          <p:nvPr>
-            <p:ph idx="1"/>
-          </p:nvPr>
-        </p:nvSpPr>
-        <p:spPr/>
-        <p:txBody>
-          <a:bodyPr>
-            <a:normAutofit/>
-          </a:bodyPr>
-          <a:lstStyle/>
-          <a:p>
-            <a:endParaRPr lang="en-US"/>
-          </a:p>
-        </p:txBody>
-      </p:sp>
     </p:spTree>
     <p:extLst>
       <p:ext uri="{BB962C8B-B14F-4D97-AF65-F5344CB8AC3E}">
-        <p14:creationId xmlns:p14="http://schemas.microsoft.com/office/powerpoint/2010/main" val="1974521838"/>
+        <p14:creationId xmlns:p14="http://schemas.microsoft.com/office/powerpoint/2010/main" val="1809612389"/>
       </p:ext>
     </p:extLst>
   </p:cSld>
@@ -6125,7 +6750,7 @@
 </p:sld>
 </file>
 
-<file path=ppt/slides/slide3.xml><?xml version="1.0" encoding="utf-8"?>
+<file path=ppt/slides/slide6.xml><?xml version="1.0" encoding="utf-8"?>
 <p:sld xmlns:a="http://schemas.openxmlformats.org/drawingml/2006/main" xmlns:r="http://schemas.openxmlformats.org/officeDocument/2006/relationships" xmlns:p="http://schemas.openxmlformats.org/presentationml/2006/main">
   <p:cSld>
     <p:bg>
@@ -6229,7 +6854,7 @@
 </p:sld>
 </file>
 
-<file path=ppt/slides/slide4.xml><?xml version="1.0" encoding="utf-8"?>
+<file path=ppt/slides/slide7.xml><?xml version="1.0" encoding="utf-8"?>
 <p:sld xmlns:a="http://schemas.openxmlformats.org/drawingml/2006/main" xmlns:r="http://schemas.openxmlformats.org/officeDocument/2006/relationships" xmlns:p="http://schemas.openxmlformats.org/presentationml/2006/main">
   <p:cSld>
     <p:spTree>
@@ -6278,10 +6903,10 @@
       </p:pic>
       <p:pic>
         <p:nvPicPr>
-          <p:cNvPr id="3" name="Picture 2">
+          <p:cNvPr id="5" name="Picture 4">
             <a:extLst>
               <a:ext uri="{FF2B5EF4-FFF2-40B4-BE49-F238E27FC236}">
-                <a16:creationId xmlns:a16="http://schemas.microsoft.com/office/drawing/2014/main" id="{AF9BC203-E9A6-9B44-8033-06876D48F01A}"/>
+                <a16:creationId xmlns:a16="http://schemas.microsoft.com/office/drawing/2014/main" id="{0EB23560-B2C0-204C-95D8-1C46300C58A7}"/>
               </a:ext>
             </a:extLst>
           </p:cNvPr>
@@ -6298,8 +6923,8 @@
         </p:blipFill>
         <p:spPr>
           <a:xfrm>
-            <a:off x="0" y="11217"/>
-            <a:ext cx="12192000" cy="4123912"/>
+            <a:off x="46987" y="0"/>
+            <a:ext cx="6049013" cy="6858000"/>
           </a:xfrm>
           <a:prstGeom prst="rect">
             <a:avLst/>
@@ -6319,200 +6944,7 @@
 </p:sld>
 </file>
 
-<file path=ppt/slides/slide5.xml><?xml version="1.0" encoding="utf-8"?>
-<p:sld xmlns:a="http://schemas.openxmlformats.org/drawingml/2006/main" xmlns:r="http://schemas.openxmlformats.org/officeDocument/2006/relationships" xmlns:p="http://schemas.openxmlformats.org/presentationml/2006/main">
-  <p:cSld>
-    <p:bg>
-      <p:bgPr>
-        <a:blipFill>
-          <a:blip r:embed="rId2">
-            <a:extLst/>
-          </a:blip>
-          <a:stretch/>
-        </a:blipFill>
-        <a:effectLst/>
-      </p:bgPr>
-    </p:bg>
-    <p:spTree>
-      <p:nvGrpSpPr>
-        <p:cNvPr id="1" name=""/>
-        <p:cNvGrpSpPr/>
-        <p:nvPr/>
-      </p:nvGrpSpPr>
-      <p:grpSpPr>
-        <a:xfrm>
-          <a:off x="0" y="0"/>
-          <a:ext cx="0" cy="0"/>
-          <a:chOff x="0" y="0"/>
-          <a:chExt cx="0" cy="0"/>
-        </a:xfrm>
-      </p:grpSpPr>
-      <p:pic>
-        <p:nvPicPr>
-          <p:cNvPr id="13" name="Picture 12">
-            <a:extLst>
-              <a:ext uri="{FF2B5EF4-FFF2-40B4-BE49-F238E27FC236}">
-                <a16:creationId xmlns:a16="http://schemas.microsoft.com/office/drawing/2014/main" id="{6AF6706C-CF07-43A1-BCC4-CBA5D33820DA}"/>
-              </a:ext>
-              <a:ext uri="{C183D7F6-B498-43B3-948B-1728B52AA6E4}">
-                <adec:decorative xmlns:adec="http://schemas.microsoft.com/office/drawing/2017/decorative" val="1"/>
-              </a:ext>
-            </a:extLst>
-          </p:cNvPr>
-          <p:cNvPicPr>
-            <a:picLocks noGrp="1" noRot="1" noChangeAspect="1" noMove="1" noResize="1" noEditPoints="1" noAdjustHandles="1" noChangeArrowheads="1" noChangeShapeType="1" noCrop="1"/>
-          </p:cNvPicPr>
-          <p:nvPr>
-            <p:extLst>
-              <p:ext uri="{386F3935-93C4-4BCD-93E2-E3B085C9AB24}">
-                <p16:designElem xmlns:p16="http://schemas.microsoft.com/office/powerpoint/2015/main" val="1"/>
-              </p:ext>
-            </p:extLst>
-          </p:nvPr>
-        </p:nvPicPr>
-        <p:blipFill>
-          <a:blip r:embed="rId3">
-            <a:extLst>
-              <a:ext uri="{28A0092B-C50C-407E-A947-70E740481C1C}">
-                <a14:useLocalDpi xmlns:a14="http://schemas.microsoft.com/office/drawing/2010/main" val="0"/>
-              </a:ext>
-            </a:extLst>
-          </a:blip>
-          <a:stretch>
-            <a:fillRect/>
-          </a:stretch>
-        </p:blipFill>
-        <p:spPr>
-          <a:xfrm>
-            <a:off x="0" y="0"/>
-            <a:ext cx="12188825" cy="6856214"/>
-          </a:xfrm>
-          <a:prstGeom prst="rect">
-            <a:avLst/>
-          </a:prstGeom>
-        </p:spPr>
-      </p:pic>
-      <p:sp>
-        <p:nvSpPr>
-          <p:cNvPr id="6" name="TextBox 5">
-            <a:extLst>
-              <a:ext uri="{FF2B5EF4-FFF2-40B4-BE49-F238E27FC236}">
-                <a16:creationId xmlns:a16="http://schemas.microsoft.com/office/drawing/2014/main" id="{4434FC64-3EA1-194B-8D5F-413FE67516F0}"/>
-              </a:ext>
-            </a:extLst>
-          </p:cNvPr>
-          <p:cNvSpPr txBox="1"/>
-          <p:nvPr/>
-        </p:nvSpPr>
-        <p:spPr>
-          <a:xfrm>
-            <a:off x="643464" y="639097"/>
-            <a:ext cx="4789678" cy="3746634"/>
-          </a:xfrm>
-          <a:prstGeom prst="rect">
-            <a:avLst/>
-          </a:prstGeom>
-        </p:spPr>
-        <p:txBody>
-          <a:bodyPr vert="horz" lIns="91440" tIns="45720" rIns="91440" bIns="45720" rtlCol="0" anchor="b">
-            <a:normAutofit/>
-          </a:bodyPr>
-          <a:lstStyle/>
-          <a:p>
-            <a:pPr algn="r">
-              <a:spcBef>
-                <a:spcPct val="0"/>
-              </a:spcBef>
-              <a:spcAft>
-                <a:spcPts val="600"/>
-              </a:spcAft>
-            </a:pPr>
-            <a:r>
-              <a:rPr lang="en-US" sz="4800" cap="all">
-                <a:ln w="3175" cmpd="sng">
-                  <a:noFill/>
-                </a:ln>
-                <a:latin typeface="+mj-lt"/>
-                <a:ea typeface="+mj-ea"/>
-                <a:cs typeface="+mj-cs"/>
-              </a:rPr>
-              <a:t>And now for a demo…</a:t>
-            </a:r>
-          </a:p>
-        </p:txBody>
-      </p:sp>
-      <p:pic>
-        <p:nvPicPr>
-          <p:cNvPr id="8" name="Picture 7">
-            <a:extLst>
-              <a:ext uri="{FF2B5EF4-FFF2-40B4-BE49-F238E27FC236}">
-                <a16:creationId xmlns:a16="http://schemas.microsoft.com/office/drawing/2014/main" id="{A76ED285-9B3B-6941-A913-12B4B9DE2B74}"/>
-              </a:ext>
-            </a:extLst>
-          </p:cNvPr>
-          <p:cNvPicPr>
-            <a:picLocks noChangeAspect="1"/>
-          </p:cNvPicPr>
-          <p:nvPr/>
-        </p:nvPicPr>
-        <p:blipFill>
-          <a:blip r:embed="rId4"/>
-          <a:stretch>
-            <a:fillRect/>
-          </a:stretch>
-        </p:blipFill>
-        <p:spPr>
-          <a:xfrm>
-            <a:off x="6076606" y="1573201"/>
-            <a:ext cx="5471927" cy="3707230"/>
-          </a:xfrm>
-          <a:prstGeom prst="roundRect">
-            <a:avLst>
-              <a:gd name="adj" fmla="val 4380"/>
-            </a:avLst>
-          </a:prstGeom>
-          <a:ln w="50800" cap="sq" cmpd="dbl">
-            <a:gradFill flip="none" rotWithShape="1">
-              <a:gsLst>
-                <a:gs pos="0">
-                  <a:srgbClr val="FFFFFF"/>
-                </a:gs>
-                <a:gs pos="100000">
-                  <a:schemeClr val="tx1">
-                    <a:alpha val="0"/>
-                  </a:schemeClr>
-                </a:gs>
-              </a:gsLst>
-              <a:path path="circle">
-                <a:fillToRect l="50000" t="50000" r="50000" b="50000"/>
-              </a:path>
-              <a:tileRect/>
-            </a:gradFill>
-            <a:miter lim="800000"/>
-          </a:ln>
-          <a:effectLst>
-            <a:outerShdw blurRad="254000" algn="tl" rotWithShape="0">
-              <a:srgbClr val="000000">
-                <a:alpha val="43000"/>
-              </a:srgbClr>
-            </a:outerShdw>
-          </a:effectLst>
-        </p:spPr>
-      </p:pic>
-    </p:spTree>
-    <p:extLst>
-      <p:ext uri="{BB962C8B-B14F-4D97-AF65-F5344CB8AC3E}">
-        <p14:creationId xmlns:p14="http://schemas.microsoft.com/office/powerpoint/2010/main" val="3384690365"/>
-      </p:ext>
-    </p:extLst>
-  </p:cSld>
-  <p:clrMapOvr>
-    <a:masterClrMapping/>
-  </p:clrMapOvr>
-</p:sld>
-</file>
-
-<file path=ppt/slides/slide6.xml><?xml version="1.0" encoding="utf-8"?>
+<file path=ppt/slides/slide8.xml><?xml version="1.0" encoding="utf-8"?>
 <p:sld xmlns:a="http://schemas.openxmlformats.org/drawingml/2006/main" xmlns:r="http://schemas.openxmlformats.org/officeDocument/2006/relationships" xmlns:p="http://schemas.openxmlformats.org/presentationml/2006/main">
   <p:cSld>
     <p:bg>
@@ -6708,7 +7140,7 @@
 </p:sld>
 </file>
 
-<file path=ppt/slides/slide7.xml><?xml version="1.0" encoding="utf-8"?>
+<file path=ppt/slides/slide9.xml><?xml version="1.0" encoding="utf-8"?>
 <p:sld xmlns:a="http://schemas.openxmlformats.org/drawingml/2006/main" xmlns:r="http://schemas.openxmlformats.org/officeDocument/2006/relationships" xmlns:p="http://schemas.openxmlformats.org/presentationml/2006/main">
   <p:cSld>
     <p:spTree>
@@ -6725,164 +7157,10 @@
           <a:chExt cx="0" cy="0"/>
         </a:xfrm>
       </p:grpSpPr>
-      <p:pic>
-        <p:nvPicPr>
-          <p:cNvPr id="7" name="Picture 6">
-            <a:extLst>
-              <a:ext uri="{FF2B5EF4-FFF2-40B4-BE49-F238E27FC236}">
-                <a16:creationId xmlns:a16="http://schemas.microsoft.com/office/drawing/2014/main" id="{3BE3EE35-A0F4-174D-BE61-9B552A225BA6}"/>
-              </a:ext>
-            </a:extLst>
-          </p:cNvPr>
-          <p:cNvPicPr>
-            <a:picLocks noChangeAspect="1"/>
-          </p:cNvPicPr>
-          <p:nvPr/>
-        </p:nvPicPr>
-        <p:blipFill>
-          <a:blip r:embed="rId2"/>
-          <a:stretch>
-            <a:fillRect/>
-          </a:stretch>
-        </p:blipFill>
-        <p:spPr>
-          <a:xfrm>
-            <a:off x="3711639" y="353406"/>
-            <a:ext cx="4768722" cy="5920670"/>
-          </a:xfrm>
-          <a:prstGeom prst="rect">
-            <a:avLst/>
-          </a:prstGeom>
-        </p:spPr>
-      </p:pic>
     </p:spTree>
     <p:extLst>
       <p:ext uri="{BB962C8B-B14F-4D97-AF65-F5344CB8AC3E}">
         <p14:creationId xmlns:p14="http://schemas.microsoft.com/office/powerpoint/2010/main" val="1494503666"/>
-      </p:ext>
-    </p:extLst>
-  </p:cSld>
-  <p:clrMapOvr>
-    <a:masterClrMapping/>
-  </p:clrMapOvr>
-</p:sld>
-</file>
-
-<file path=ppt/slides/slide8.xml><?xml version="1.0" encoding="utf-8"?>
-<p:sld xmlns:a="http://schemas.openxmlformats.org/drawingml/2006/main" xmlns:r="http://schemas.openxmlformats.org/officeDocument/2006/relationships" xmlns:p="http://schemas.openxmlformats.org/presentationml/2006/main">
-  <p:cSld>
-    <p:spTree>
-      <p:nvGrpSpPr>
-        <p:cNvPr id="1" name=""/>
-        <p:cNvGrpSpPr/>
-        <p:nvPr/>
-      </p:nvGrpSpPr>
-      <p:grpSpPr>
-        <a:xfrm>
-          <a:off x="0" y="0"/>
-          <a:ext cx="0" cy="0"/>
-          <a:chOff x="0" y="0"/>
-          <a:chExt cx="0" cy="0"/>
-        </a:xfrm>
-      </p:grpSpPr>
-      <p:sp>
-        <p:nvSpPr>
-          <p:cNvPr id="2" name="Title 1">
-            <a:extLst>
-              <a:ext uri="{FF2B5EF4-FFF2-40B4-BE49-F238E27FC236}">
-                <a16:creationId xmlns:a16="http://schemas.microsoft.com/office/drawing/2014/main" id="{8A15E44B-8D52-2942-B951-9B44BA75ABEA}"/>
-              </a:ext>
-            </a:extLst>
-          </p:cNvPr>
-          <p:cNvSpPr>
-            <a:spLocks noGrp="1"/>
-          </p:cNvSpPr>
-          <p:nvPr>
-            <p:ph type="title"/>
-          </p:nvPr>
-        </p:nvSpPr>
-        <p:spPr/>
-        <p:txBody>
-          <a:bodyPr/>
-          <a:lstStyle/>
-          <a:p>
-            <a:r>
-              <a:rPr lang="en-US" dirty="0"/>
-              <a:t>Website</a:t>
-            </a:r>
-          </a:p>
-        </p:txBody>
-      </p:sp>
-      <p:sp>
-        <p:nvSpPr>
-          <p:cNvPr id="3" name="Content Placeholder 2">
-            <a:extLst>
-              <a:ext uri="{FF2B5EF4-FFF2-40B4-BE49-F238E27FC236}">
-                <a16:creationId xmlns:a16="http://schemas.microsoft.com/office/drawing/2014/main" id="{AAC4512B-95DB-5A4C-B101-568EB1D24424}"/>
-              </a:ext>
-            </a:extLst>
-          </p:cNvPr>
-          <p:cNvSpPr>
-            <a:spLocks noGrp="1"/>
-          </p:cNvSpPr>
-          <p:nvPr>
-            <p:ph idx="1"/>
-          </p:nvPr>
-        </p:nvSpPr>
-        <p:spPr/>
-        <p:txBody>
-          <a:bodyPr>
-            <a:normAutofit/>
-          </a:bodyPr>
-          <a:lstStyle/>
-          <a:p>
-            <a:pPr marL="0" indent="0">
-              <a:buNone/>
-            </a:pPr>
-            <a:r>
-              <a:rPr lang="en-US" sz="2000" b="1" dirty="0">
-                <a:hlinkClick r:id="rId2"/>
-              </a:rPr>
-              <a:t>https://baylorsailor.github.io/C.A.R./site</a:t>
-            </a:r>
-            <a:endParaRPr lang="en-US" sz="2000" b="1" dirty="0"/>
-          </a:p>
-        </p:txBody>
-      </p:sp>
-      <p:pic>
-        <p:nvPicPr>
-          <p:cNvPr id="4" name="Picture 3">
-            <a:extLst>
-              <a:ext uri="{FF2B5EF4-FFF2-40B4-BE49-F238E27FC236}">
-                <a16:creationId xmlns:a16="http://schemas.microsoft.com/office/drawing/2014/main" id="{028A15CB-9C13-4E4F-990D-A79D4338D78A}"/>
-              </a:ext>
-            </a:extLst>
-          </p:cNvPr>
-          <p:cNvPicPr>
-            <a:picLocks noChangeAspect="1"/>
-          </p:cNvPicPr>
-          <p:nvPr/>
-        </p:nvPicPr>
-        <p:blipFill>
-          <a:blip r:embed="rId3"/>
-          <a:stretch>
-            <a:fillRect/>
-          </a:stretch>
-        </p:blipFill>
-        <p:spPr>
-          <a:xfrm>
-            <a:off x="8834422" y="5161997"/>
-            <a:ext cx="2968655" cy="1665111"/>
-          </a:xfrm>
-          <a:prstGeom prst="rect">
-            <a:avLst/>
-          </a:prstGeom>
-        </p:spPr>
-      </p:pic>
-    </p:spTree>
-    <p:extLst>
-      <p:ext uri="{BB962C8B-B14F-4D97-AF65-F5344CB8AC3E}">
-        <p14:creationId xmlns:p14="http://schemas.microsoft.com/office/powerpoint/2010/main" val="1049443972"/>
       </p:ext>
     </p:extLst>
   </p:cSld>

</xml_diff>